<commit_message>
Re-organized into points, bars, lines, exotica, maps
</commit_message>
<xml_diff>
--- a/src/data-visualization.pptx
+++ b/src/data-visualization.pptx
@@ -5,7 +5,7 @@
     <p:sldMasterId id="2147483648" r:id="rId1"/>
   </p:sldMasterIdLst>
   <p:notesMasterIdLst>
-    <p:NotesMasterId r:id="rId43"/>
+    <p:NotesMasterId r:id="rId52"/>
   </p:notesMasterIdLst>
   <p:sldIdLst>
     <p:sldId id="256" r:id="rId2"/>
@@ -49,6 +49,15 @@
     <p:sldId id="294" r:id="rId40"/>
     <p:sldId id="295" r:id="rId41"/>
     <p:sldId id="296" r:id="rId42"/>
+    <p:sldId id="297" r:id="rId43"/>
+    <p:sldId id="298" r:id="rId44"/>
+    <p:sldId id="299" r:id="rId45"/>
+    <p:sldId id="300" r:id="rId46"/>
+    <p:sldId id="301" r:id="rId47"/>
+    <p:sldId id="302" r:id="rId48"/>
+    <p:sldId id="303" r:id="rId49"/>
+    <p:sldId id="304" r:id="rId50"/>
+    <p:sldId id="305" r:id="rId51"/>
   </p:sldIdLst>
   <p:sldSz cx="9144000" cy="6858000" type="screen4x3"/>
   <p:notesSz cx="6858000" cy="9144000"/>
@@ -30619,39 +30628,46 @@
             </a:pPr>
             <a:r>
               <a:rPr/>
-              <a:t>Aesthetics</a:t>
-            </a:r>
-            <a:r>
-              <a:rPr/>
-              <a:t> </a:t>
-            </a:r>
-            <a:r>
-              <a:rPr/>
-              <a:t>for</a:t>
-            </a:r>
-            <a:r>
-              <a:rPr/>
-              <a:t> </a:t>
-            </a:r>
-            <a:r>
-              <a:rPr/>
-              <a:t>points</a:t>
-            </a:r>
-            <a:r>
-              <a:rPr/>
-              <a:t> </a:t>
-            </a:r>
-            <a:r>
-              <a:rPr/>
-              <a:t>-</a:t>
-            </a:r>
-            <a:r>
-              <a:rPr/>
-              <a:t> </a:t>
-            </a:r>
-            <a:r>
-              <a:rPr/>
-              <a:t>shape</a:t>
+              <a:t>On</a:t>
+            </a:r>
+            <a:r>
+              <a:rPr/>
+              <a:t> </a:t>
+            </a:r>
+            <a:r>
+              <a:rPr/>
+              <a:t>your</a:t>
+            </a:r>
+            <a:r>
+              <a:rPr/>
+              <a:t> </a:t>
+            </a:r>
+            <a:r>
+              <a:rPr/>
+              <a:t>own</a:t>
+            </a:r>
+          </a:p>
+        </p:txBody>
+      </p:sp>
+      <p:sp>
+        <p:nvSpPr>
+          <p:cNvPr id="3" name="Content Placeholder 2"/>
+          <p:cNvSpPr>
+            <a:spLocks noGrp="1"/>
+          </p:cNvSpPr>
+          <p:nvPr>
+            <p:ph idx="1"/>
+          </p:nvPr>
+        </p:nvSpPr>
+        <p:spPr/>
+        <p:txBody>
+          <a:bodyPr/>
+          <a:lstStyle/>
+          <a:p>
+            <a:pPr lvl="1"/>
+            <a:r>
+              <a:rPr/>
+              <a:t>Revise the plot so that the location of the points represents x=Bedrooms and Y=Price.</a:t>
             </a:r>
           </a:p>
         </p:txBody>
@@ -30698,73 +30714,102 @@
             </a:pPr>
             <a:r>
               <a:rPr/>
-              <a:t>Aesthetics</a:t>
-            </a:r>
-            <a:r>
-              <a:rPr/>
-              <a:t> </a:t>
-            </a:r>
-            <a:r>
-              <a:rPr/>
-              <a:t>for</a:t>
-            </a:r>
-            <a:r>
-              <a:rPr/>
-              <a:t> </a:t>
-            </a:r>
-            <a:r>
-              <a:rPr/>
-              <a:t>points</a:t>
-            </a:r>
-            <a:r>
-              <a:rPr/>
-              <a:t> </a:t>
-            </a:r>
-            <a:r>
-              <a:rPr/>
-              <a:t>-</a:t>
-            </a:r>
-            <a:r>
-              <a:rPr/>
-              <a:t> </a:t>
-            </a:r>
-            <a:r>
-              <a:rPr/>
-              <a:t>size</a:t>
+              <a:t>Wait</a:t>
+            </a:r>
+            <a:r>
+              <a:rPr/>
+              <a:t> </a:t>
+            </a:r>
+            <a:r>
+              <a:rPr/>
+              <a:t>before</a:t>
+            </a:r>
+            <a:r>
+              <a:rPr/>
+              <a:t> </a:t>
+            </a:r>
+            <a:r>
+              <a:rPr/>
+              <a:t>showing</a:t>
             </a:r>
           </a:p>
         </p:txBody>
       </p:sp>
-      <p:pic>
-        <p:nvPicPr>
-          <p:cNvPr descr="data-visualization_files/figure-pptx/point-aesthetics-size-1.png" id="0" name="Picture 1"/>
-          <p:cNvPicPr>
-            <a:picLocks noGrp="1" noChangeAspect="1"/>
-          </p:cNvPicPr>
-          <p:nvPr/>
-        </p:nvPicPr>
-        <p:blipFill>
-          <a:blip r:embed="rId2"/>
-          <a:stretch>
-            <a:fillRect/>
-          </a:stretch>
-        </p:blipFill>
-        <p:spPr bwMode="auto">
-          <a:xfrm>
-            <a:off x="1752600" y="1600200"/>
-            <a:ext cx="5651500" cy="4521200"/>
-          </a:xfrm>
-          <a:prstGeom prst="rect">
-            <a:avLst/>
-          </a:prstGeom>
-          <a:noFill/>
-          <a:ln w="9525">
-            <a:noFill/>
-            <a:headEnd/>
-            <a:tailEnd/>
-          </a:ln>
-        </p:spPr>
-      </p:pic>
+      <p:sp>
+        <p:nvSpPr>
+          <p:cNvPr id="3" name="Content Placeholder 2"/>
+          <p:cNvSpPr>
+            <a:spLocks noGrp="1"/>
+          </p:cNvSpPr>
+          <p:nvPr>
+            <p:ph idx="1"/>
+          </p:nvPr>
+        </p:nvSpPr>
+        <p:spPr/>
+        <p:txBody>
+          <a:bodyPr/>
+          <a:lstStyle/>
+          <a:p>
+            <a:pPr lvl="0" marL="0" indent="0">
+              <a:buNone/>
+            </a:pPr>
+            <a:r>
+              <a:rPr/>
+              <a:t>Here’s the Python code.</a:t>
+            </a:r>
+          </a:p>
+          <a:p>
+            <a:pPr lvl="0" marL="1270000" indent="0">
+              <a:buNone/>
+            </a:pPr>
+            <a:r>
+              <a:rPr sz="1800">
+                <a:latin typeface="Courier"/>
+              </a:rPr>
+              <a:t>((To be added later))</a:t>
+            </a:r>
+          </a:p>
+          <a:p>
+            <a:pPr lvl="0" marL="0" indent="0">
+              <a:buNone/>
+            </a:pPr>
+            <a:r>
+              <a:rPr/>
+              <a:t>Here’s the R code.</a:t>
+            </a:r>
+          </a:p>
+          <a:p>
+            <a:pPr lvl="0" marL="1270000" indent="0">
+              <a:buNone/>
+            </a:pPr>
+            <a:r>
+              <a:rPr sz="1800">
+                <a:latin typeface="Courier"/>
+              </a:rPr>
+              <a:t>ggplot(saratoga_houses, aes(x=Bedrooms, y=Price)) + 
+  geom_point())</a:t>
+            </a:r>
+          </a:p>
+          <a:p>
+            <a:pPr lvl="0" marL="0" indent="0">
+              <a:buNone/>
+            </a:pPr>
+            <a:r>
+              <a:rPr/>
+              <a:t>Here are the steps in Tableau.</a:t>
+            </a:r>
+          </a:p>
+          <a:p>
+            <a:pPr lvl="0" marL="0" indent="0">
+              <a:buNone/>
+            </a:pPr>
+            <a:r>
+              <a:rPr/>
+              <a:t>((To be added later))</a:t>
+            </a:r>
+          </a:p>
+        </p:txBody>
+      </p:sp>
     </p:spTree>
   </p:cSld>
 </p:sld>
@@ -30807,70 +30852,54 @@
             </a:pPr>
             <a:r>
               <a:rPr/>
-              <a:t>Aesthetics</a:t>
-            </a:r>
-            <a:r>
-              <a:rPr/>
-              <a:t> </a:t>
-            </a:r>
-            <a:r>
-              <a:rPr/>
-              <a:t>for</a:t>
-            </a:r>
-            <a:r>
-              <a:rPr/>
-              <a:t> </a:t>
-            </a:r>
-            <a:r>
-              <a:rPr/>
-              <a:t>points</a:t>
-            </a:r>
-            <a:r>
-              <a:rPr/>
-              <a:t> </a:t>
-            </a:r>
-            <a:r>
-              <a:rPr/>
-              <a:t>-</a:t>
-            </a:r>
-            <a:r>
-              <a:rPr/>
-              <a:t> </a:t>
-            </a:r>
-            <a:r>
-              <a:rPr/>
-              <a:t>color</a:t>
-            </a:r>
-            <a:r>
-              <a:rPr/>
-              <a:t> </a:t>
-            </a:r>
-            <a:r>
-              <a:rPr/>
-              <a:t>(1</a:t>
-            </a:r>
-            <a:r>
-              <a:rPr/>
-              <a:t> </a:t>
-            </a:r>
-            <a:r>
-              <a:rPr/>
-              <a:t>of</a:t>
-            </a:r>
-            <a:r>
-              <a:rPr/>
-              <a:t> </a:t>
-            </a:r>
-            <a:r>
-              <a:rPr/>
-              <a:t>2)</a:t>
+              <a:t>What</a:t>
+            </a:r>
+            <a:r>
+              <a:rPr/>
+              <a:t> </a:t>
+            </a:r>
+            <a:r>
+              <a:rPr/>
+              <a:t>your</a:t>
+            </a:r>
+            <a:r>
+              <a:rPr/>
+              <a:t> </a:t>
+            </a:r>
+            <a:r>
+              <a:rPr/>
+              <a:t>visualization</a:t>
+            </a:r>
+            <a:r>
+              <a:rPr/>
+              <a:t> </a:t>
+            </a:r>
+            <a:r>
+              <a:rPr/>
+              <a:t>might</a:t>
+            </a:r>
+            <a:r>
+              <a:rPr/>
+              <a:t> </a:t>
+            </a:r>
+            <a:r>
+              <a:rPr/>
+              <a:t>look</a:t>
+            </a:r>
+            <a:r>
+              <a:rPr/>
+              <a:t> </a:t>
+            </a:r>
+            <a:r>
+              <a:rPr/>
+              <a:t>like.</a:t>
             </a:r>
           </a:p>
         </p:txBody>
       </p:sp>
       <p:pic>
         <p:nvPicPr>
-          <p:cNvPr descr="data-visualization_files/figure-pptx/point-aesthetics-color-1-1.png" id="0" name="Picture 1"/>
+          <p:cNvPr descr="data-visualization_files/figure-pptx/bedrooms-and-living-space-1.png" id="0" name="Picture 1"/>
           <p:cNvPicPr>
             <a:picLocks noGrp="1" noChangeAspect="1"/>
           </p:cNvPicPr>
@@ -30956,11 +30985,57 @@
             </a:r>
             <a:r>
               <a:rPr/>
-              <a:t>lines</a:t>
+              <a:t>points</a:t>
+            </a:r>
+            <a:r>
+              <a:rPr/>
+              <a:t> </a:t>
+            </a:r>
+            <a:r>
+              <a:rPr/>
+              <a:t>-</a:t>
+            </a:r>
+            <a:r>
+              <a:rPr/>
+              <a:t> </a:t>
+            </a:r>
+            <a:r>
+              <a:rPr/>
+              <a:t>shape</a:t>
             </a:r>
           </a:p>
         </p:txBody>
       </p:sp>
+      <p:pic>
+        <p:nvPicPr>
+          <p:cNvPr descr="data-visualization_files/figure-pptx/point-aesthetics-shape-1.png" id="0" name="Picture 1"/>
+          <p:cNvPicPr>
+            <a:picLocks noGrp="1" noChangeAspect="1"/>
+          </p:cNvPicPr>
+          <p:nvPr/>
+        </p:nvPicPr>
+        <p:blipFill>
+          <a:blip r:embed="rId2"/>
+          <a:stretch>
+            <a:fillRect/>
+          </a:stretch>
+        </p:blipFill>
+        <p:spPr bwMode="auto">
+          <a:xfrm>
+            <a:off x="1752600" y="1600200"/>
+            <a:ext cx="5651500" cy="4521200"/>
+          </a:xfrm>
+          <a:prstGeom prst="rect">
+            <a:avLst/>
+          </a:prstGeom>
+          <a:noFill/>
+          <a:ln w="9525">
+            <a:noFill/>
+            <a:headEnd/>
+            <a:tailEnd/>
+          </a:ln>
+        </p:spPr>
+      </p:pic>
     </p:spTree>
   </p:cSld>
 </p:sld>
@@ -31003,23 +31078,23 @@
             </a:pPr>
             <a:r>
               <a:rPr/>
-              <a:t>Aesthetics</a:t>
-            </a:r>
-            <a:r>
-              <a:rPr/>
-              <a:t> </a:t>
-            </a:r>
-            <a:r>
-              <a:rPr/>
-              <a:t>for</a:t>
-            </a:r>
-            <a:r>
-              <a:rPr/>
-              <a:t> </a:t>
-            </a:r>
-            <a:r>
-              <a:rPr/>
-              <a:t>bars</a:t>
+              <a:t>On</a:t>
+            </a:r>
+            <a:r>
+              <a:rPr/>
+              <a:t> </a:t>
+            </a:r>
+            <a:r>
+              <a:rPr/>
+              <a:t>your</a:t>
+            </a:r>
+            <a:r>
+              <a:rPr/>
+              <a:t> </a:t>
+            </a:r>
+            <a:r>
+              <a:rPr/>
+              <a:t>own</a:t>
             </a:r>
           </a:p>
         </p:txBody>
@@ -31039,21 +31114,10 @@
           <a:bodyPr/>
           <a:lstStyle/>
           <a:p>
-            <a:pPr lvl="0" marL="0" indent="0">
-              <a:buNone/>
-            </a:pPr>
-            <a:r>
-              <a:rPr/>
-              <a:t>Position is the physical location of the geometry/mark. Since I have constrained myself to a static two-dimensional world, there are two dimensions to position. These correspond to the horizontal and vertical position, or to the x and y axes. Postion exists on a continuum. Shape is categorical. It can represent discrete values but not values on a continuum.</a:t>
-            </a:r>
-          </a:p>
-          <a:p>
-            <a:pPr lvl="0" marL="0" indent="0">
-              <a:buNone/>
-            </a:pPr>
-            <a:r>
-              <a:rPr/>
-              <a:t>Size is on a continuum. Normally, you think of size as a single dimension, area, but you can vary size in both the horizontal and vertical dimension independently. I don’t recommend this in most settings</a:t>
+            <a:pPr lvl="1"/>
+            <a:r>
+              <a:rPr/>
+              <a:t>Draw a plot where the location is x=Age and y=Price and the symbol represents the number of bedrooms.</a:t>
             </a:r>
           </a:p>
         </p:txBody>
@@ -31100,47 +31164,98 @@
             </a:pPr>
             <a:r>
               <a:rPr/>
-              <a:t>The</a:t>
-            </a:r>
-            <a:r>
-              <a:rPr/>
-              <a:t> </a:t>
-            </a:r>
-            <a:r>
-              <a:rPr/>
-              <a:t>myth</a:t>
-            </a:r>
-            <a:r>
-              <a:rPr/>
-              <a:t> </a:t>
-            </a:r>
-            <a:r>
-              <a:rPr/>
-              <a:t>of</a:t>
-            </a:r>
-            <a:r>
-              <a:rPr/>
-              <a:t> </a:t>
-            </a:r>
-            <a:r>
-              <a:rPr/>
-              <a:t>the</a:t>
-            </a:r>
-            <a:r>
-              <a:rPr/>
-              <a:t> </a:t>
-            </a:r>
-            <a:r>
-              <a:rPr/>
-              <a:t>objective</a:t>
-            </a:r>
-            <a:r>
-              <a:rPr/>
-              <a:t> </a:t>
-            </a:r>
-            <a:r>
-              <a:rPr/>
-              <a:t>visualization</a:t>
+              <a:t>Wait</a:t>
+            </a:r>
+            <a:r>
+              <a:rPr/>
+              <a:t> </a:t>
+            </a:r>
+            <a:r>
+              <a:rPr/>
+              <a:t>before</a:t>
+            </a:r>
+            <a:r>
+              <a:rPr/>
+              <a:t> </a:t>
+            </a:r>
+            <a:r>
+              <a:rPr/>
+              <a:t>showing</a:t>
+            </a:r>
+          </a:p>
+        </p:txBody>
+      </p:sp>
+      <p:sp>
+        <p:nvSpPr>
+          <p:cNvPr id="3" name="Content Placeholder 2"/>
+          <p:cNvSpPr>
+            <a:spLocks noGrp="1"/>
+          </p:cNvSpPr>
+          <p:nvPr>
+            <p:ph idx="1"/>
+          </p:nvPr>
+        </p:nvSpPr>
+        <p:spPr/>
+        <p:txBody>
+          <a:bodyPr/>
+          <a:lstStyle/>
+          <a:p>
+            <a:pPr lvl="0" marL="0" indent="0">
+              <a:buNone/>
+            </a:pPr>
+            <a:r>
+              <a:rPr/>
+              <a:t>Here’s the Python code.</a:t>
+            </a:r>
+          </a:p>
+          <a:p>
+            <a:pPr lvl="0" marL="1270000" indent="0">
+              <a:buNone/>
+            </a:pPr>
+            <a:r>
+              <a:rPr sz="1800">
+                <a:latin typeface="Courier"/>
+              </a:rPr>
+              <a:t>((To be added later))</a:t>
+            </a:r>
+          </a:p>
+          <a:p>
+            <a:pPr lvl="0" marL="0" indent="0">
+              <a:buNone/>
+            </a:pPr>
+            <a:r>
+              <a:rPr/>
+              <a:t>Here’s the R code.</a:t>
+            </a:r>
+          </a:p>
+          <a:p>
+            <a:pPr lvl="0" marL="1270000" indent="0">
+              <a:buNone/>
+            </a:pPr>
+            <a:r>
+              <a:rPr sz="1800">
+                <a:latin typeface="Courier"/>
+              </a:rPr>
+              <a:t>ggplot(saratoga_houses, aes(x=Age, y=Price)) + 
+  geom_point(aes(shape=factor(Bedrooms)))</a:t>
+            </a:r>
+          </a:p>
+          <a:p>
+            <a:pPr lvl="0" marL="0" indent="0">
+              <a:buNone/>
+            </a:pPr>
+            <a:r>
+              <a:rPr/>
+              <a:t>Here are the steps in Tableau.</a:t>
+            </a:r>
+          </a:p>
+          <a:p>
+            <a:pPr lvl="0" marL="0" indent="0">
+              <a:buNone/>
+            </a:pPr>
+            <a:r>
+              <a:rPr/>
+              <a:t>((To be added later))</a:t>
             </a:r>
           </a:p>
         </p:txBody>
@@ -31328,35 +31443,81 @@
             </a:pPr>
             <a:r>
               <a:rPr/>
-              <a:t>The</a:t>
-            </a:r>
-            <a:r>
-              <a:rPr/>
-              <a:t> </a:t>
-            </a:r>
-            <a:r>
-              <a:rPr/>
-              <a:t>psychology</a:t>
-            </a:r>
-            <a:r>
-              <a:rPr/>
-              <a:t> </a:t>
-            </a:r>
-            <a:r>
-              <a:rPr/>
-              <a:t>of</a:t>
-            </a:r>
-            <a:r>
-              <a:rPr/>
-              <a:t> </a:t>
-            </a:r>
-            <a:r>
-              <a:rPr/>
-              <a:t>perception</a:t>
+              <a:t>What</a:t>
+            </a:r>
+            <a:r>
+              <a:rPr/>
+              <a:t> </a:t>
+            </a:r>
+            <a:r>
+              <a:rPr/>
+              <a:t>your</a:t>
+            </a:r>
+            <a:r>
+              <a:rPr/>
+              <a:t> </a:t>
+            </a:r>
+            <a:r>
+              <a:rPr/>
+              <a:t>visualization</a:t>
+            </a:r>
+            <a:r>
+              <a:rPr/>
+              <a:t> </a:t>
+            </a:r>
+            <a:r>
+              <a:rPr/>
+              <a:t>might</a:t>
+            </a:r>
+            <a:r>
+              <a:rPr/>
+              <a:t> </a:t>
+            </a:r>
+            <a:r>
+              <a:rPr/>
+              <a:t>look</a:t>
+            </a:r>
+            <a:r>
+              <a:rPr/>
+              <a:t> </a:t>
+            </a:r>
+            <a:r>
+              <a:rPr/>
+              <a:t>like.</a:t>
             </a:r>
           </a:p>
         </p:txBody>
       </p:sp>
+      <p:pic>
+        <p:nvPicPr>
+          <p:cNvPr descr="data-visualization_files/figure-pptx/shapes-bedrooms-1.png" id="0" name="Picture 1"/>
+          <p:cNvPicPr>
+            <a:picLocks noGrp="1" noChangeAspect="1"/>
+          </p:cNvPicPr>
+          <p:nvPr/>
+        </p:nvPicPr>
+        <p:blipFill>
+          <a:blip r:embed="rId2"/>
+          <a:stretch>
+            <a:fillRect/>
+          </a:stretch>
+        </p:blipFill>
+        <p:spPr bwMode="auto">
+          <a:xfrm>
+            <a:off x="1752600" y="1600200"/>
+            <a:ext cx="5651500" cy="4521200"/>
+          </a:xfrm>
+          <a:prstGeom prst="rect">
+            <a:avLst/>
+          </a:prstGeom>
+          <a:noFill/>
+          <a:ln w="9525">
+            <a:noFill/>
+            <a:headEnd/>
+            <a:tailEnd/>
+          </a:ln>
+        </p:spPr>
+      </p:pic>
     </p:spTree>
   </p:cSld>
 </p:sld>
@@ -31399,23 +31560,861 @@
             </a:pPr>
             <a:r>
               <a:rPr/>
-              <a:t>Maps</a:t>
-            </a:r>
-            <a:r>
-              <a:rPr/>
-              <a:t> </a:t>
-            </a:r>
-            <a:r>
-              <a:rPr/>
-              <a:t>and</a:t>
-            </a:r>
-            <a:r>
-              <a:rPr/>
-              <a:t> </a:t>
-            </a:r>
-            <a:r>
-              <a:rPr/>
-              <a:t>projections</a:t>
+              <a:t>Aesthetics</a:t>
+            </a:r>
+            <a:r>
+              <a:rPr/>
+              <a:t> </a:t>
+            </a:r>
+            <a:r>
+              <a:rPr/>
+              <a:t>for</a:t>
+            </a:r>
+            <a:r>
+              <a:rPr/>
+              <a:t> </a:t>
+            </a:r>
+            <a:r>
+              <a:rPr/>
+              <a:t>points</a:t>
+            </a:r>
+            <a:r>
+              <a:rPr/>
+              <a:t> </a:t>
+            </a:r>
+            <a:r>
+              <a:rPr/>
+              <a:t>-</a:t>
+            </a:r>
+            <a:r>
+              <a:rPr/>
+              <a:t> </a:t>
+            </a:r>
+            <a:r>
+              <a:rPr/>
+              <a:t>size</a:t>
+            </a:r>
+          </a:p>
+        </p:txBody>
+      </p:sp>
+      <p:pic>
+        <p:nvPicPr>
+          <p:cNvPr descr="data-visualization_files/figure-pptx/point-aesthetics-size-1.png" id="0" name="Picture 1"/>
+          <p:cNvPicPr>
+            <a:picLocks noGrp="1" noChangeAspect="1"/>
+          </p:cNvPicPr>
+          <p:nvPr/>
+        </p:nvPicPr>
+        <p:blipFill>
+          <a:blip r:embed="rId2"/>
+          <a:stretch>
+            <a:fillRect/>
+          </a:stretch>
+        </p:blipFill>
+        <p:spPr bwMode="auto">
+          <a:xfrm>
+            <a:off x="1752600" y="1600200"/>
+            <a:ext cx="5651500" cy="4521200"/>
+          </a:xfrm>
+          <a:prstGeom prst="rect">
+            <a:avLst/>
+          </a:prstGeom>
+          <a:noFill/>
+          <a:ln w="9525">
+            <a:noFill/>
+            <a:headEnd/>
+            <a:tailEnd/>
+          </a:ln>
+        </p:spPr>
+      </p:pic>
+    </p:spTree>
+  </p:cSld>
+</p:sld>
+</file>
+
+<file path=ppt/slides/slide42.xml><?xml version="1.0" encoding="utf-8"?>
+<p:sld xmlns:a="http://schemas.openxmlformats.org/drawingml/2006/main" xmlns:r="http://schemas.openxmlformats.org/officeDocument/2006/relationships" xmlns:p="http://schemas.openxmlformats.org/presentationml/2006/main">
+  <p:cSld>
+    <p:spTree>
+      <p:nvGrpSpPr>
+        <p:cNvPr id="1" name=""/>
+        <p:cNvGrpSpPr/>
+        <p:nvPr/>
+      </p:nvGrpSpPr>
+      <p:grpSpPr>
+        <a:xfrm>
+          <a:off x="0" y="0"/>
+          <a:ext cx="0" cy="0"/>
+          <a:chOff x="0" y="0"/>
+          <a:chExt cx="0" cy="0"/>
+        </a:xfrm>
+      </p:grpSpPr>
+      <p:sp>
+        <p:nvSpPr>
+          <p:cNvPr id="2" name="Title 1"/>
+          <p:cNvSpPr>
+            <a:spLocks noGrp="1"/>
+          </p:cNvSpPr>
+          <p:nvPr>
+            <p:ph type="title"/>
+          </p:nvPr>
+        </p:nvSpPr>
+        <p:spPr/>
+        <p:txBody>
+          <a:bodyPr/>
+          <a:lstStyle/>
+          <a:p>
+            <a:pPr lvl="0" marL="0" indent="0">
+              <a:buNone/>
+            </a:pPr>
+            <a:r>
+              <a:rPr/>
+              <a:t>On</a:t>
+            </a:r>
+            <a:r>
+              <a:rPr/>
+              <a:t> </a:t>
+            </a:r>
+            <a:r>
+              <a:rPr/>
+              <a:t>your</a:t>
+            </a:r>
+            <a:r>
+              <a:rPr/>
+              <a:t> </a:t>
+            </a:r>
+            <a:r>
+              <a:rPr/>
+              <a:t>own</a:t>
+            </a:r>
+          </a:p>
+        </p:txBody>
+      </p:sp>
+      <p:sp>
+        <p:nvSpPr>
+          <p:cNvPr id="3" name="Content Placeholder 2"/>
+          <p:cNvSpPr>
+            <a:spLocks noGrp="1"/>
+          </p:cNvSpPr>
+          <p:nvPr>
+            <p:ph idx="1"/>
+          </p:nvPr>
+        </p:nvSpPr>
+        <p:spPr/>
+        <p:txBody>
+          <a:bodyPr/>
+          <a:lstStyle/>
+          <a:p>
+            <a:pPr lvl="1"/>
+            <a:r>
+              <a:rPr/>
+              <a:t>Draw a plot where the location is x=Age and y=Price and the size represents the number of bedrooms.</a:t>
+            </a:r>
+          </a:p>
+        </p:txBody>
+      </p:sp>
+    </p:spTree>
+  </p:cSld>
+</p:sld>
+</file>
+
+<file path=ppt/slides/slide43.xml><?xml version="1.0" encoding="utf-8"?>
+<p:sld xmlns:a="http://schemas.openxmlformats.org/drawingml/2006/main" xmlns:r="http://schemas.openxmlformats.org/officeDocument/2006/relationships" xmlns:p="http://schemas.openxmlformats.org/presentationml/2006/main">
+  <p:cSld>
+    <p:spTree>
+      <p:nvGrpSpPr>
+        <p:cNvPr id="1" name=""/>
+        <p:cNvGrpSpPr/>
+        <p:nvPr/>
+      </p:nvGrpSpPr>
+      <p:grpSpPr>
+        <a:xfrm>
+          <a:off x="0" y="0"/>
+          <a:ext cx="0" cy="0"/>
+          <a:chOff x="0" y="0"/>
+          <a:chExt cx="0" cy="0"/>
+        </a:xfrm>
+      </p:grpSpPr>
+      <p:sp>
+        <p:nvSpPr>
+          <p:cNvPr id="2" name="Title 1"/>
+          <p:cNvSpPr>
+            <a:spLocks noGrp="1"/>
+          </p:cNvSpPr>
+          <p:nvPr>
+            <p:ph type="title"/>
+          </p:nvPr>
+        </p:nvSpPr>
+        <p:spPr/>
+        <p:txBody>
+          <a:bodyPr/>
+          <a:lstStyle/>
+          <a:p>
+            <a:pPr lvl="0" marL="0" indent="0">
+              <a:buNone/>
+            </a:pPr>
+            <a:r>
+              <a:rPr/>
+              <a:t>Wait</a:t>
+            </a:r>
+            <a:r>
+              <a:rPr/>
+              <a:t> </a:t>
+            </a:r>
+            <a:r>
+              <a:rPr/>
+              <a:t>before</a:t>
+            </a:r>
+            <a:r>
+              <a:rPr/>
+              <a:t> </a:t>
+            </a:r>
+            <a:r>
+              <a:rPr/>
+              <a:t>showing</a:t>
+            </a:r>
+          </a:p>
+        </p:txBody>
+      </p:sp>
+      <p:sp>
+        <p:nvSpPr>
+          <p:cNvPr id="3" name="Content Placeholder 2"/>
+          <p:cNvSpPr>
+            <a:spLocks noGrp="1"/>
+          </p:cNvSpPr>
+          <p:nvPr>
+            <p:ph idx="1"/>
+          </p:nvPr>
+        </p:nvSpPr>
+        <p:spPr/>
+        <p:txBody>
+          <a:bodyPr/>
+          <a:lstStyle/>
+          <a:p>
+            <a:pPr lvl="0" marL="0" indent="0">
+              <a:buNone/>
+            </a:pPr>
+            <a:r>
+              <a:rPr/>
+              <a:t>Here’s the Python code.</a:t>
+            </a:r>
+          </a:p>
+          <a:p>
+            <a:pPr lvl="0" marL="1270000" indent="0">
+              <a:buNone/>
+            </a:pPr>
+            <a:r>
+              <a:rPr sz="1800">
+                <a:latin typeface="Courier"/>
+              </a:rPr>
+              <a:t>((To be added later))</a:t>
+            </a:r>
+          </a:p>
+          <a:p>
+            <a:pPr lvl="0" marL="0" indent="0">
+              <a:buNone/>
+            </a:pPr>
+            <a:r>
+              <a:rPr/>
+              <a:t>Here’s the R code.</a:t>
+            </a:r>
+          </a:p>
+          <a:p>
+            <a:pPr lvl="0" marL="1270000" indent="0">
+              <a:buNone/>
+            </a:pPr>
+            <a:r>
+              <a:rPr sz="1800">
+                <a:latin typeface="Courier"/>
+              </a:rPr>
+              <a:t>ggplot(saratoga_houses, aes(x=Age, y=Price)) + 
+  geom_point(aes(size=Bedrooms))</a:t>
+            </a:r>
+          </a:p>
+          <a:p>
+            <a:pPr lvl="0" marL="0" indent="0">
+              <a:buNone/>
+            </a:pPr>
+            <a:r>
+              <a:rPr/>
+              <a:t>Here are the steps in Tableau.</a:t>
+            </a:r>
+          </a:p>
+          <a:p>
+            <a:pPr lvl="0" marL="0" indent="0">
+              <a:buNone/>
+            </a:pPr>
+            <a:r>
+              <a:rPr/>
+              <a:t>((To be added later))</a:t>
+            </a:r>
+          </a:p>
+        </p:txBody>
+      </p:sp>
+    </p:spTree>
+  </p:cSld>
+</p:sld>
+</file>
+
+<file path=ppt/slides/slide44.xml><?xml version="1.0" encoding="utf-8"?>
+<p:sld xmlns:a="http://schemas.openxmlformats.org/drawingml/2006/main" xmlns:r="http://schemas.openxmlformats.org/officeDocument/2006/relationships" xmlns:p="http://schemas.openxmlformats.org/presentationml/2006/main">
+  <p:cSld>
+    <p:spTree>
+      <p:nvGrpSpPr>
+        <p:cNvPr id="1" name=""/>
+        <p:cNvGrpSpPr/>
+        <p:nvPr/>
+      </p:nvGrpSpPr>
+      <p:grpSpPr>
+        <a:xfrm>
+          <a:off x="0" y="0"/>
+          <a:ext cx="0" cy="0"/>
+          <a:chOff x="0" y="0"/>
+          <a:chExt cx="0" cy="0"/>
+        </a:xfrm>
+      </p:grpSpPr>
+      <p:sp>
+        <p:nvSpPr>
+          <p:cNvPr id="2" name="Title 1"/>
+          <p:cNvSpPr>
+            <a:spLocks noGrp="1"/>
+          </p:cNvSpPr>
+          <p:nvPr>
+            <p:ph type="title"/>
+          </p:nvPr>
+        </p:nvSpPr>
+        <p:spPr/>
+        <p:txBody>
+          <a:bodyPr/>
+          <a:lstStyle/>
+          <a:p>
+            <a:pPr lvl="0" marL="0" indent="0">
+              <a:buNone/>
+            </a:pPr>
+            <a:r>
+              <a:rPr/>
+              <a:t>What</a:t>
+            </a:r>
+            <a:r>
+              <a:rPr/>
+              <a:t> </a:t>
+            </a:r>
+            <a:r>
+              <a:rPr/>
+              <a:t>your</a:t>
+            </a:r>
+            <a:r>
+              <a:rPr/>
+              <a:t> </a:t>
+            </a:r>
+            <a:r>
+              <a:rPr/>
+              <a:t>visualization</a:t>
+            </a:r>
+            <a:r>
+              <a:rPr/>
+              <a:t> </a:t>
+            </a:r>
+            <a:r>
+              <a:rPr/>
+              <a:t>might</a:t>
+            </a:r>
+            <a:r>
+              <a:rPr/>
+              <a:t> </a:t>
+            </a:r>
+            <a:r>
+              <a:rPr/>
+              <a:t>look</a:t>
+            </a:r>
+            <a:r>
+              <a:rPr/>
+              <a:t> </a:t>
+            </a:r>
+            <a:r>
+              <a:rPr/>
+              <a:t>like.</a:t>
+            </a:r>
+          </a:p>
+        </p:txBody>
+      </p:sp>
+      <p:pic>
+        <p:nvPicPr>
+          <p:cNvPr descr="data-visualization_files/figure-pptx/size-bedrooms-1.png" id="0" name="Picture 1"/>
+          <p:cNvPicPr>
+            <a:picLocks noGrp="1" noChangeAspect="1"/>
+          </p:cNvPicPr>
+          <p:nvPr/>
+        </p:nvPicPr>
+        <p:blipFill>
+          <a:blip r:embed="rId2"/>
+          <a:stretch>
+            <a:fillRect/>
+          </a:stretch>
+        </p:blipFill>
+        <p:spPr bwMode="auto">
+          <a:xfrm>
+            <a:off x="1752600" y="1600200"/>
+            <a:ext cx="5651500" cy="4521200"/>
+          </a:xfrm>
+          <a:prstGeom prst="rect">
+            <a:avLst/>
+          </a:prstGeom>
+          <a:noFill/>
+          <a:ln w="9525">
+            <a:noFill/>
+            <a:headEnd/>
+            <a:tailEnd/>
+          </a:ln>
+        </p:spPr>
+      </p:pic>
+    </p:spTree>
+  </p:cSld>
+</p:sld>
+</file>
+
+<file path=ppt/slides/slide45.xml><?xml version="1.0" encoding="utf-8"?>
+<p:sld xmlns:a="http://schemas.openxmlformats.org/drawingml/2006/main" xmlns:r="http://schemas.openxmlformats.org/officeDocument/2006/relationships" xmlns:p="http://schemas.openxmlformats.org/presentationml/2006/main">
+  <p:cSld>
+    <p:spTree>
+      <p:nvGrpSpPr>
+        <p:cNvPr id="1" name=""/>
+        <p:cNvGrpSpPr/>
+        <p:nvPr/>
+      </p:nvGrpSpPr>
+      <p:grpSpPr>
+        <a:xfrm>
+          <a:off x="0" y="0"/>
+          <a:ext cx="0" cy="0"/>
+          <a:chOff x="0" y="0"/>
+          <a:chExt cx="0" cy="0"/>
+        </a:xfrm>
+      </p:grpSpPr>
+      <p:sp>
+        <p:nvSpPr>
+          <p:cNvPr id="2" name="Title 1"/>
+          <p:cNvSpPr>
+            <a:spLocks noGrp="1"/>
+          </p:cNvSpPr>
+          <p:nvPr>
+            <p:ph type="title"/>
+          </p:nvPr>
+        </p:nvSpPr>
+        <p:spPr/>
+        <p:txBody>
+          <a:bodyPr/>
+          <a:lstStyle/>
+          <a:p>
+            <a:pPr lvl="0" marL="0" indent="0">
+              <a:buNone/>
+            </a:pPr>
+            <a:r>
+              <a:rPr/>
+              <a:t>Aesthetics</a:t>
+            </a:r>
+            <a:r>
+              <a:rPr/>
+              <a:t> </a:t>
+            </a:r>
+            <a:r>
+              <a:rPr/>
+              <a:t>for</a:t>
+            </a:r>
+            <a:r>
+              <a:rPr/>
+              <a:t> </a:t>
+            </a:r>
+            <a:r>
+              <a:rPr/>
+              <a:t>points</a:t>
+            </a:r>
+            <a:r>
+              <a:rPr/>
+              <a:t> </a:t>
+            </a:r>
+            <a:r>
+              <a:rPr/>
+              <a:t>-</a:t>
+            </a:r>
+            <a:r>
+              <a:rPr/>
+              <a:t> </a:t>
+            </a:r>
+            <a:r>
+              <a:rPr/>
+              <a:t>color</a:t>
+            </a:r>
+            <a:r>
+              <a:rPr/>
+              <a:t> </a:t>
+            </a:r>
+            <a:r>
+              <a:rPr/>
+              <a:t>(1</a:t>
+            </a:r>
+            <a:r>
+              <a:rPr/>
+              <a:t> </a:t>
+            </a:r>
+            <a:r>
+              <a:rPr/>
+              <a:t>of</a:t>
+            </a:r>
+            <a:r>
+              <a:rPr/>
+              <a:t> </a:t>
+            </a:r>
+            <a:r>
+              <a:rPr/>
+              <a:t>2)</a:t>
+            </a:r>
+          </a:p>
+        </p:txBody>
+      </p:sp>
+      <p:pic>
+        <p:nvPicPr>
+          <p:cNvPr descr="data-visualization_files/figure-pptx/point-aesthetics-color-1-1.png" id="0" name="Picture 1"/>
+          <p:cNvPicPr>
+            <a:picLocks noGrp="1" noChangeAspect="1"/>
+          </p:cNvPicPr>
+          <p:nvPr/>
+        </p:nvPicPr>
+        <p:blipFill>
+          <a:blip r:embed="rId2"/>
+          <a:stretch>
+            <a:fillRect/>
+          </a:stretch>
+        </p:blipFill>
+        <p:spPr bwMode="auto">
+          <a:xfrm>
+            <a:off x="1752600" y="1600200"/>
+            <a:ext cx="5651500" cy="4521200"/>
+          </a:xfrm>
+          <a:prstGeom prst="rect">
+            <a:avLst/>
+          </a:prstGeom>
+          <a:noFill/>
+          <a:ln w="9525">
+            <a:noFill/>
+            <a:headEnd/>
+            <a:tailEnd/>
+          </a:ln>
+        </p:spPr>
+      </p:pic>
+    </p:spTree>
+  </p:cSld>
+</p:sld>
+</file>
+
+<file path=ppt/slides/slide46.xml><?xml version="1.0" encoding="utf-8"?>
+<p:sld xmlns:a="http://schemas.openxmlformats.org/drawingml/2006/main" xmlns:r="http://schemas.openxmlformats.org/officeDocument/2006/relationships" xmlns:p="http://schemas.openxmlformats.org/presentationml/2006/main">
+  <p:cSld>
+    <p:spTree>
+      <p:nvGrpSpPr>
+        <p:cNvPr id="1" name=""/>
+        <p:cNvGrpSpPr/>
+        <p:nvPr/>
+      </p:nvGrpSpPr>
+      <p:grpSpPr>
+        <a:xfrm>
+          <a:off x="0" y="0"/>
+          <a:ext cx="0" cy="0"/>
+          <a:chOff x="0" y="0"/>
+          <a:chExt cx="0" cy="0"/>
+        </a:xfrm>
+      </p:grpSpPr>
+      <p:sp>
+        <p:nvSpPr>
+          <p:cNvPr id="2" name="Title 1"/>
+          <p:cNvSpPr>
+            <a:spLocks noGrp="1"/>
+          </p:cNvSpPr>
+          <p:nvPr>
+            <p:ph type="title"/>
+          </p:nvPr>
+        </p:nvSpPr>
+        <p:spPr/>
+        <p:txBody>
+          <a:bodyPr/>
+          <a:lstStyle/>
+          <a:p>
+            <a:pPr lvl="0" marL="0" indent="0">
+              <a:buNone/>
+            </a:pPr>
+            <a:r>
+              <a:rPr/>
+              <a:t>Aesthetics</a:t>
+            </a:r>
+            <a:r>
+              <a:rPr/>
+              <a:t> </a:t>
+            </a:r>
+            <a:r>
+              <a:rPr/>
+              <a:t>for</a:t>
+            </a:r>
+            <a:r>
+              <a:rPr/>
+              <a:t> </a:t>
+            </a:r>
+            <a:r>
+              <a:rPr/>
+              <a:t>lines</a:t>
+            </a:r>
+          </a:p>
+        </p:txBody>
+      </p:sp>
+    </p:spTree>
+  </p:cSld>
+</p:sld>
+</file>
+
+<file path=ppt/slides/slide47.xml><?xml version="1.0" encoding="utf-8"?>
+<p:sld xmlns:a="http://schemas.openxmlformats.org/drawingml/2006/main" xmlns:r="http://schemas.openxmlformats.org/officeDocument/2006/relationships" xmlns:p="http://schemas.openxmlformats.org/presentationml/2006/main">
+  <p:cSld>
+    <p:spTree>
+      <p:nvGrpSpPr>
+        <p:cNvPr id="1" name=""/>
+        <p:cNvGrpSpPr/>
+        <p:nvPr/>
+      </p:nvGrpSpPr>
+      <p:grpSpPr>
+        <a:xfrm>
+          <a:off x="0" y="0"/>
+          <a:ext cx="0" cy="0"/>
+          <a:chOff x="0" y="0"/>
+          <a:chExt cx="0" cy="0"/>
+        </a:xfrm>
+      </p:grpSpPr>
+      <p:sp>
+        <p:nvSpPr>
+          <p:cNvPr id="2" name="Title 1"/>
+          <p:cNvSpPr>
+            <a:spLocks noGrp="1"/>
+          </p:cNvSpPr>
+          <p:nvPr>
+            <p:ph type="title"/>
+          </p:nvPr>
+        </p:nvSpPr>
+        <p:spPr/>
+        <p:txBody>
+          <a:bodyPr/>
+          <a:lstStyle/>
+          <a:p>
+            <a:pPr lvl="0" marL="0" indent="0">
+              <a:buNone/>
+            </a:pPr>
+            <a:r>
+              <a:rPr/>
+              <a:t>Aesthetics</a:t>
+            </a:r>
+            <a:r>
+              <a:rPr/>
+              <a:t> </a:t>
+            </a:r>
+            <a:r>
+              <a:rPr/>
+              <a:t>for</a:t>
+            </a:r>
+            <a:r>
+              <a:rPr/>
+              <a:t> </a:t>
+            </a:r>
+            <a:r>
+              <a:rPr/>
+              <a:t>bars</a:t>
+            </a:r>
+          </a:p>
+        </p:txBody>
+      </p:sp>
+      <p:sp>
+        <p:nvSpPr>
+          <p:cNvPr id="3" name="Content Placeholder 2"/>
+          <p:cNvSpPr>
+            <a:spLocks noGrp="1"/>
+          </p:cNvSpPr>
+          <p:nvPr>
+            <p:ph idx="1"/>
+          </p:nvPr>
+        </p:nvSpPr>
+        <p:spPr/>
+        <p:txBody>
+          <a:bodyPr/>
+          <a:lstStyle/>
+          <a:p>
+            <a:pPr lvl="0" marL="0" indent="0">
+              <a:buNone/>
+            </a:pPr>
+            <a:r>
+              <a:rPr/>
+              <a:t>Position is the physical location of the geometry/mark. Since I have constrained myself to a static two-dimensional world, there are two dimensions to position. These correspond to the horizontal and vertical position, or to the x and y axes. Postion exists on a continuum. Shape is categorical. It can represent discrete values but not values on a continuum.</a:t>
+            </a:r>
+          </a:p>
+          <a:p>
+            <a:pPr lvl="0" marL="0" indent="0">
+              <a:buNone/>
+            </a:pPr>
+            <a:r>
+              <a:rPr/>
+              <a:t>Size is on a continuum. Normally, you think of size as a single dimension, area, but you can vary size in both the horizontal and vertical dimension independently. I don’t recommend this in most settings</a:t>
+            </a:r>
+          </a:p>
+        </p:txBody>
+      </p:sp>
+    </p:spTree>
+  </p:cSld>
+</p:sld>
+</file>
+
+<file path=ppt/slides/slide48.xml><?xml version="1.0" encoding="utf-8"?>
+<p:sld xmlns:a="http://schemas.openxmlformats.org/drawingml/2006/main" xmlns:r="http://schemas.openxmlformats.org/officeDocument/2006/relationships" xmlns:p="http://schemas.openxmlformats.org/presentationml/2006/main">
+  <p:cSld>
+    <p:spTree>
+      <p:nvGrpSpPr>
+        <p:cNvPr id="1" name=""/>
+        <p:cNvGrpSpPr/>
+        <p:nvPr/>
+      </p:nvGrpSpPr>
+      <p:grpSpPr>
+        <a:xfrm>
+          <a:off x="0" y="0"/>
+          <a:ext cx="0" cy="0"/>
+          <a:chOff x="0" y="0"/>
+          <a:chExt cx="0" cy="0"/>
+        </a:xfrm>
+      </p:grpSpPr>
+      <p:sp>
+        <p:nvSpPr>
+          <p:cNvPr id="2" name="Title 1"/>
+          <p:cNvSpPr>
+            <a:spLocks noGrp="1"/>
+          </p:cNvSpPr>
+          <p:nvPr>
+            <p:ph type="title"/>
+          </p:nvPr>
+        </p:nvSpPr>
+        <p:spPr/>
+        <p:txBody>
+          <a:bodyPr/>
+          <a:lstStyle/>
+          <a:p>
+            <a:pPr lvl="0" marL="0" indent="0">
+              <a:buNone/>
+            </a:pPr>
+            <a:r>
+              <a:rPr/>
+              <a:t>The</a:t>
+            </a:r>
+            <a:r>
+              <a:rPr/>
+              <a:t> </a:t>
+            </a:r>
+            <a:r>
+              <a:rPr/>
+              <a:t>myth</a:t>
+            </a:r>
+            <a:r>
+              <a:rPr/>
+              <a:t> </a:t>
+            </a:r>
+            <a:r>
+              <a:rPr/>
+              <a:t>of</a:t>
+            </a:r>
+            <a:r>
+              <a:rPr/>
+              <a:t> </a:t>
+            </a:r>
+            <a:r>
+              <a:rPr/>
+              <a:t>the</a:t>
+            </a:r>
+            <a:r>
+              <a:rPr/>
+              <a:t> </a:t>
+            </a:r>
+            <a:r>
+              <a:rPr/>
+              <a:t>objective</a:t>
+            </a:r>
+            <a:r>
+              <a:rPr/>
+              <a:t> </a:t>
+            </a:r>
+            <a:r>
+              <a:rPr/>
+              <a:t>visualization</a:t>
+            </a:r>
+          </a:p>
+        </p:txBody>
+      </p:sp>
+    </p:spTree>
+  </p:cSld>
+</p:sld>
+</file>
+
+<file path=ppt/slides/slide49.xml><?xml version="1.0" encoding="utf-8"?>
+<p:sld xmlns:a="http://schemas.openxmlformats.org/drawingml/2006/main" xmlns:r="http://schemas.openxmlformats.org/officeDocument/2006/relationships" xmlns:p="http://schemas.openxmlformats.org/presentationml/2006/main">
+  <p:cSld>
+    <p:spTree>
+      <p:nvGrpSpPr>
+        <p:cNvPr id="1" name=""/>
+        <p:cNvGrpSpPr/>
+        <p:nvPr/>
+      </p:nvGrpSpPr>
+      <p:grpSpPr>
+        <a:xfrm>
+          <a:off x="0" y="0"/>
+          <a:ext cx="0" cy="0"/>
+          <a:chOff x="0" y="0"/>
+          <a:chExt cx="0" cy="0"/>
+        </a:xfrm>
+      </p:grpSpPr>
+      <p:sp>
+        <p:nvSpPr>
+          <p:cNvPr id="2" name="Title 1"/>
+          <p:cNvSpPr>
+            <a:spLocks noGrp="1"/>
+          </p:cNvSpPr>
+          <p:nvPr>
+            <p:ph type="title"/>
+          </p:nvPr>
+        </p:nvSpPr>
+        <p:spPr/>
+        <p:txBody>
+          <a:bodyPr/>
+          <a:lstStyle/>
+          <a:p>
+            <a:pPr lvl="0" marL="0" indent="0">
+              <a:buNone/>
+            </a:pPr>
+            <a:r>
+              <a:rPr/>
+              <a:t>The</a:t>
+            </a:r>
+            <a:r>
+              <a:rPr/>
+              <a:t> </a:t>
+            </a:r>
+            <a:r>
+              <a:rPr/>
+              <a:t>psychology</a:t>
+            </a:r>
+            <a:r>
+              <a:rPr/>
+              <a:t> </a:t>
+            </a:r>
+            <a:r>
+              <a:rPr/>
+              <a:t>of</a:t>
+            </a:r>
+            <a:r>
+              <a:rPr/>
+              <a:t> </a:t>
+            </a:r>
+            <a:r>
+              <a:rPr/>
+              <a:t>perception</a:t>
             </a:r>
           </a:p>
         </p:txBody>
@@ -31651,6 +32650,69 @@
             <a:r>
               <a:rPr/>
               <a:t>back</a:t>
+            </a:r>
+          </a:p>
+        </p:txBody>
+      </p:sp>
+    </p:spTree>
+  </p:cSld>
+</p:sld>
+</file>
+
+<file path=ppt/slides/slide50.xml><?xml version="1.0" encoding="utf-8"?>
+<p:sld xmlns:a="http://schemas.openxmlformats.org/drawingml/2006/main" xmlns:r="http://schemas.openxmlformats.org/officeDocument/2006/relationships" xmlns:p="http://schemas.openxmlformats.org/presentationml/2006/main">
+  <p:cSld>
+    <p:spTree>
+      <p:nvGrpSpPr>
+        <p:cNvPr id="1" name=""/>
+        <p:cNvGrpSpPr/>
+        <p:nvPr/>
+      </p:nvGrpSpPr>
+      <p:grpSpPr>
+        <a:xfrm>
+          <a:off x="0" y="0"/>
+          <a:ext cx="0" cy="0"/>
+          <a:chOff x="0" y="0"/>
+          <a:chExt cx="0" cy="0"/>
+        </a:xfrm>
+      </p:grpSpPr>
+      <p:sp>
+        <p:nvSpPr>
+          <p:cNvPr id="2" name="Title 1"/>
+          <p:cNvSpPr>
+            <a:spLocks noGrp="1"/>
+          </p:cNvSpPr>
+          <p:nvPr>
+            <p:ph type="title"/>
+          </p:nvPr>
+        </p:nvSpPr>
+        <p:spPr/>
+        <p:txBody>
+          <a:bodyPr/>
+          <a:lstStyle/>
+          <a:p>
+            <a:pPr lvl="0" marL="0" indent="0">
+              <a:buNone/>
+            </a:pPr>
+            <a:r>
+              <a:rPr/>
+              <a:t>Maps</a:t>
+            </a:r>
+            <a:r>
+              <a:rPr/>
+              <a:t> </a:t>
+            </a:r>
+            <a:r>
+              <a:rPr/>
+              <a:t>and</a:t>
+            </a:r>
+            <a:r>
+              <a:rPr/>
+              <a:t> </a:t>
+            </a:r>
+            <a:r>
+              <a:rPr/>
+              <a:t>projections</a:t>
             </a:r>
           </a:p>
         </p:txBody>

</xml_diff>